<commit_message>
bring forward the title
</commit_message>
<xml_diff>
--- a/inst/mnb100.pptx
+++ b/inst/mnb100.pptx
@@ -3797,8 +3797,8 @@
         </p:nvSpPr>
         <p:spPr>
           <a:xfrm>
-            <a:off x="1" y="0"/>
-            <a:ext cx="9156902" cy="5156215"/>
+            <a:off x="1" y="295275"/>
+            <a:ext cx="9156902" cy="4860940"/>
           </a:xfrm>
           <a:prstGeom prst="rect">
             <a:avLst/>
@@ -3872,8 +3872,8 @@
         </p:blipFill>
         <p:spPr>
           <a:xfrm>
-            <a:off x="1" y="-13987"/>
-            <a:ext cx="9067917" cy="754766"/>
+            <a:off x="1" y="0"/>
+            <a:ext cx="9143999" cy="740778"/>
           </a:xfrm>
           <a:prstGeom prst="rect">
             <a:avLst/>
@@ -3951,38 +3951,6 @@
       </p:sp>
       <p:sp>
         <p:nvSpPr>
-          <p:cNvPr id="2" name="Title Placeholder 1"/>
-          <p:cNvSpPr>
-            <a:spLocks noGrp="1"/>
-          </p:cNvSpPr>
-          <p:nvPr>
-            <p:ph type="title"/>
-          </p:nvPr>
-        </p:nvSpPr>
-        <p:spPr>
-          <a:xfrm>
-            <a:off x="149086" y="-19879"/>
-            <a:ext cx="7852031" cy="857250"/>
-          </a:xfrm>
-          <a:prstGeom prst="rect">
-            <a:avLst/>
-          </a:prstGeom>
-        </p:spPr>
-        <p:txBody>
-          <a:bodyPr vert="horz" lIns="91440" tIns="45720" rIns="91440" bIns="45720" rtlCol="0" anchor="ctr">
-            <a:normAutofit/>
-          </a:bodyPr>
-          <a:lstStyle/>
-          <a:p>
-            <a:r>
-              <a:rPr lang="en-US" dirty="0"/>
-              <a:t>Click to edit Master title style</a:t>
-            </a:r>
-          </a:p>
-        </p:txBody>
-      </p:sp>
-      <p:sp>
-        <p:nvSpPr>
           <p:cNvPr id="3" name="Text Placeholder 2"/>
           <p:cNvSpPr>
             <a:spLocks noGrp="1"/>
@@ -4131,6 +4099,38 @@
           </a:effectLst>
         </p:spPr>
       </p:pic>
+      <p:sp>
+        <p:nvSpPr>
+          <p:cNvPr id="2" name="Title Placeholder 1"/>
+          <p:cNvSpPr>
+            <a:spLocks noGrp="1"/>
+          </p:cNvSpPr>
+          <p:nvPr>
+            <p:ph type="title"/>
+          </p:nvPr>
+        </p:nvSpPr>
+        <p:spPr>
+          <a:xfrm>
+            <a:off x="149086" y="-19879"/>
+            <a:ext cx="7852031" cy="857250"/>
+          </a:xfrm>
+          <a:prstGeom prst="rect">
+            <a:avLst/>
+          </a:prstGeom>
+        </p:spPr>
+        <p:txBody>
+          <a:bodyPr vert="horz" lIns="91440" tIns="45720" rIns="91440" bIns="45720" rtlCol="0" anchor="ctr">
+            <a:normAutofit/>
+          </a:bodyPr>
+          <a:lstStyle/>
+          <a:p>
+            <a:r>
+              <a:rPr lang="en-US" dirty="0"/>
+              <a:t>Click to edit Master title style</a:t>
+            </a:r>
+          </a:p>
+        </p:txBody>
+      </p:sp>
     </p:spTree>
     <p:extLst>
       <p:ext uri="{BB962C8B-B14F-4D97-AF65-F5344CB8AC3E}">

</xml_diff>